<commit_message>
Project Document & Source Code
</commit_message>
<xml_diff>
--- a/Dpdr ppt.pptx
+++ b/Dpdr ppt.pptx
@@ -146,6 +146,311 @@
 
 <file path=ppt/changesInfos/changesInfo1.xml><?xml version="1.0" encoding="utf-8"?>
 <pc:chgInfo xmlns:a="http://schemas.openxmlformats.org/drawingml/2006/main" xmlns:r="http://schemas.openxmlformats.org/officeDocument/2006/relationships" xmlns:ac="http://schemas.microsoft.com/office/drawing/2013/main/command" xmlns:pc="http://schemas.microsoft.com/office/powerpoint/2013/main/command">
+  <pc:docChgLst>
+    <pc:chgData name="Shreyas kumbar" userId="f1f765b0ac44d8da" providerId="LiveId" clId="{DBFF365C-EF49-4CC6-B5B0-B944393A3BCD}"/>
+    <pc:docChg chg="undo custSel modSld">
+      <pc:chgData name="Shreyas kumbar" userId="f1f765b0ac44d8da" providerId="LiveId" clId="{DBFF365C-EF49-4CC6-B5B0-B944393A3BCD}" dt="2023-06-29T07:51:24.410" v="18" actId="1076"/>
+      <pc:docMkLst>
+        <pc:docMk/>
+      </pc:docMkLst>
+      <pc:sldChg chg="modSp mod">
+        <pc:chgData name="Shreyas kumbar" userId="f1f765b0ac44d8da" providerId="LiveId" clId="{DBFF365C-EF49-4CC6-B5B0-B944393A3BCD}" dt="2023-06-29T07:40:30.186" v="1" actId="1076"/>
+        <pc:sldMkLst>
+          <pc:docMk/>
+          <pc:sldMk cId="3187161158" sldId="256"/>
+        </pc:sldMkLst>
+        <pc:spChg chg="mod">
+          <ac:chgData name="Shreyas kumbar" userId="f1f765b0ac44d8da" providerId="LiveId" clId="{DBFF365C-EF49-4CC6-B5B0-B944393A3BCD}" dt="2023-06-29T07:40:30.186" v="1" actId="1076"/>
+          <ac:spMkLst>
+            <pc:docMk/>
+            <pc:sldMk cId="3187161158" sldId="256"/>
+            <ac:spMk id="3" creationId="{382E1EF2-F550-48D5-E3DF-05C8BB0CB8C4}"/>
+          </ac:spMkLst>
+        </pc:spChg>
+      </pc:sldChg>
+      <pc:sldChg chg="modSp mod">
+        <pc:chgData name="Shreyas kumbar" userId="f1f765b0ac44d8da" providerId="LiveId" clId="{DBFF365C-EF49-4CC6-B5B0-B944393A3BCD}" dt="2023-06-29T07:49:35.075" v="5" actId="1076"/>
+        <pc:sldMkLst>
+          <pc:docMk/>
+          <pc:sldMk cId="2544062221" sldId="262"/>
+        </pc:sldMkLst>
+        <pc:spChg chg="mod">
+          <ac:chgData name="Shreyas kumbar" userId="f1f765b0ac44d8da" providerId="LiveId" clId="{DBFF365C-EF49-4CC6-B5B0-B944393A3BCD}" dt="2023-06-29T07:49:35.075" v="5" actId="1076"/>
+          <ac:spMkLst>
+            <pc:docMk/>
+            <pc:sldMk cId="2544062221" sldId="262"/>
+            <ac:spMk id="2" creationId="{27740E5D-AB56-F85B-A44F-63D70B1E2FF4}"/>
+          </ac:spMkLst>
+        </pc:spChg>
+      </pc:sldChg>
+      <pc:sldChg chg="addSp delSp modSp mod chgLayout">
+        <pc:chgData name="Shreyas kumbar" userId="f1f765b0ac44d8da" providerId="LiveId" clId="{DBFF365C-EF49-4CC6-B5B0-B944393A3BCD}" dt="2023-06-29T07:41:04.538" v="4" actId="6264"/>
+        <pc:sldMkLst>
+          <pc:docMk/>
+          <pc:sldMk cId="218932960" sldId="263"/>
+        </pc:sldMkLst>
+        <pc:spChg chg="mod ord">
+          <ac:chgData name="Shreyas kumbar" userId="f1f765b0ac44d8da" providerId="LiveId" clId="{DBFF365C-EF49-4CC6-B5B0-B944393A3BCD}" dt="2023-06-29T07:41:04.538" v="4" actId="6264"/>
+          <ac:spMkLst>
+            <pc:docMk/>
+            <pc:sldMk cId="218932960" sldId="263"/>
+            <ac:spMk id="2" creationId="{27740E5D-AB56-F85B-A44F-63D70B1E2FF4}"/>
+          </ac:spMkLst>
+        </pc:spChg>
+        <pc:spChg chg="mod ord">
+          <ac:chgData name="Shreyas kumbar" userId="f1f765b0ac44d8da" providerId="LiveId" clId="{DBFF365C-EF49-4CC6-B5B0-B944393A3BCD}" dt="2023-06-29T07:41:04.538" v="4" actId="6264"/>
+          <ac:spMkLst>
+            <pc:docMk/>
+            <pc:sldMk cId="218932960" sldId="263"/>
+            <ac:spMk id="3" creationId="{3DA09185-460E-A641-157D-4F9994866FFB}"/>
+          </ac:spMkLst>
+        </pc:spChg>
+        <pc:spChg chg="add del mod">
+          <ac:chgData name="Shreyas kumbar" userId="f1f765b0ac44d8da" providerId="LiveId" clId="{DBFF365C-EF49-4CC6-B5B0-B944393A3BCD}" dt="2023-06-29T07:41:02.331" v="2" actId="6264"/>
+          <ac:spMkLst>
+            <pc:docMk/>
+            <pc:sldMk cId="218932960" sldId="263"/>
+            <ac:spMk id="4" creationId="{66B89720-6E19-75B7-40C1-355CC4A26D68}"/>
+          </ac:spMkLst>
+        </pc:spChg>
+        <pc:spChg chg="add del mod">
+          <ac:chgData name="Shreyas kumbar" userId="f1f765b0ac44d8da" providerId="LiveId" clId="{DBFF365C-EF49-4CC6-B5B0-B944393A3BCD}" dt="2023-06-29T07:41:02.331" v="2" actId="6264"/>
+          <ac:spMkLst>
+            <pc:docMk/>
+            <pc:sldMk cId="218932960" sldId="263"/>
+            <ac:spMk id="5" creationId="{F70AB2FD-0C0D-69BD-9628-863ED576234A}"/>
+          </ac:spMkLst>
+        </pc:spChg>
+        <pc:spChg chg="add del mod">
+          <ac:chgData name="Shreyas kumbar" userId="f1f765b0ac44d8da" providerId="LiveId" clId="{DBFF365C-EF49-4CC6-B5B0-B944393A3BCD}" dt="2023-06-29T07:41:03.947" v="3" actId="6264"/>
+          <ac:spMkLst>
+            <pc:docMk/>
+            <pc:sldMk cId="218932960" sldId="263"/>
+            <ac:spMk id="6" creationId="{379E4ED6-D775-B12C-37E9-928D418DEAA0}"/>
+          </ac:spMkLst>
+        </pc:spChg>
+        <pc:spChg chg="add del mod">
+          <ac:chgData name="Shreyas kumbar" userId="f1f765b0ac44d8da" providerId="LiveId" clId="{DBFF365C-EF49-4CC6-B5B0-B944393A3BCD}" dt="2023-06-29T07:41:03.947" v="3" actId="6264"/>
+          <ac:spMkLst>
+            <pc:docMk/>
+            <pc:sldMk cId="218932960" sldId="263"/>
+            <ac:spMk id="7" creationId="{4B4DC1B3-F9E0-A66E-AC38-83A99F7492C7}"/>
+          </ac:spMkLst>
+        </pc:spChg>
+        <pc:spChg chg="add del mod">
+          <ac:chgData name="Shreyas kumbar" userId="f1f765b0ac44d8da" providerId="LiveId" clId="{DBFF365C-EF49-4CC6-B5B0-B944393A3BCD}" dt="2023-06-29T07:41:04.538" v="4" actId="6264"/>
+          <ac:spMkLst>
+            <pc:docMk/>
+            <pc:sldMk cId="218932960" sldId="263"/>
+            <ac:spMk id="8" creationId="{EBC02D05-C20C-8CE8-44FA-0FC443543A45}"/>
+          </ac:spMkLst>
+        </pc:spChg>
+        <pc:spChg chg="add del mod">
+          <ac:chgData name="Shreyas kumbar" userId="f1f765b0ac44d8da" providerId="LiveId" clId="{DBFF365C-EF49-4CC6-B5B0-B944393A3BCD}" dt="2023-06-29T07:41:04.538" v="4" actId="6264"/>
+          <ac:spMkLst>
+            <pc:docMk/>
+            <pc:sldMk cId="218932960" sldId="263"/>
+            <ac:spMk id="9" creationId="{95E432BB-E1E5-12DA-5CEF-B1B8E9F31F90}"/>
+          </ac:spMkLst>
+        </pc:spChg>
+      </pc:sldChg>
+      <pc:sldChg chg="modSp mod">
+        <pc:chgData name="Shreyas kumbar" userId="f1f765b0ac44d8da" providerId="LiveId" clId="{DBFF365C-EF49-4CC6-B5B0-B944393A3BCD}" dt="2023-06-29T07:50:06.484" v="6" actId="14100"/>
+        <pc:sldMkLst>
+          <pc:docMk/>
+          <pc:sldMk cId="86113793" sldId="269"/>
+        </pc:sldMkLst>
+        <pc:spChg chg="mod">
+          <ac:chgData name="Shreyas kumbar" userId="f1f765b0ac44d8da" providerId="LiveId" clId="{DBFF365C-EF49-4CC6-B5B0-B944393A3BCD}" dt="2023-06-29T07:50:06.484" v="6" actId="14100"/>
+          <ac:spMkLst>
+            <pc:docMk/>
+            <pc:sldMk cId="86113793" sldId="269"/>
+            <ac:spMk id="2" creationId="{27740E5D-AB56-F85B-A44F-63D70B1E2FF4}"/>
+          </ac:spMkLst>
+        </pc:spChg>
+      </pc:sldChg>
+      <pc:sldChg chg="modSp mod">
+        <pc:chgData name="Shreyas kumbar" userId="f1f765b0ac44d8da" providerId="LiveId" clId="{DBFF365C-EF49-4CC6-B5B0-B944393A3BCD}" dt="2023-06-29T07:50:36.464" v="8" actId="1076"/>
+        <pc:sldMkLst>
+          <pc:docMk/>
+          <pc:sldMk cId="3536377825" sldId="271"/>
+        </pc:sldMkLst>
+        <pc:spChg chg="mod">
+          <ac:chgData name="Shreyas kumbar" userId="f1f765b0ac44d8da" providerId="LiveId" clId="{DBFF365C-EF49-4CC6-B5B0-B944393A3BCD}" dt="2023-06-29T07:50:36.464" v="8" actId="1076"/>
+          <ac:spMkLst>
+            <pc:docMk/>
+            <pc:sldMk cId="3536377825" sldId="271"/>
+            <ac:spMk id="2" creationId="{4B332BD1-7547-146B-398B-ACEFDDD778BD}"/>
+          </ac:spMkLst>
+        </pc:spChg>
+      </pc:sldChg>
+      <pc:sldChg chg="modSp mod">
+        <pc:chgData name="Shreyas kumbar" userId="f1f765b0ac44d8da" providerId="LiveId" clId="{DBFF365C-EF49-4CC6-B5B0-B944393A3BCD}" dt="2023-06-29T07:50:40.286" v="9" actId="1076"/>
+        <pc:sldMkLst>
+          <pc:docMk/>
+          <pc:sldMk cId="1253564007" sldId="272"/>
+        </pc:sldMkLst>
+        <pc:spChg chg="mod">
+          <ac:chgData name="Shreyas kumbar" userId="f1f765b0ac44d8da" providerId="LiveId" clId="{DBFF365C-EF49-4CC6-B5B0-B944393A3BCD}" dt="2023-06-29T07:50:40.286" v="9" actId="1076"/>
+          <ac:spMkLst>
+            <pc:docMk/>
+            <pc:sldMk cId="1253564007" sldId="272"/>
+            <ac:spMk id="2" creationId="{B4CAA69E-1331-DD65-B8C4-65583016752F}"/>
+          </ac:spMkLst>
+        </pc:spChg>
+      </pc:sldChg>
+      <pc:sldChg chg="modSp mod">
+        <pc:chgData name="Shreyas kumbar" userId="f1f765b0ac44d8da" providerId="LiveId" clId="{DBFF365C-EF49-4CC6-B5B0-B944393A3BCD}" dt="2023-06-29T07:50:29.456" v="7" actId="1076"/>
+        <pc:sldMkLst>
+          <pc:docMk/>
+          <pc:sldMk cId="553003213" sldId="273"/>
+        </pc:sldMkLst>
+        <pc:spChg chg="mod">
+          <ac:chgData name="Shreyas kumbar" userId="f1f765b0ac44d8da" providerId="LiveId" clId="{DBFF365C-EF49-4CC6-B5B0-B944393A3BCD}" dt="2023-06-29T07:50:29.456" v="7" actId="1076"/>
+          <ac:spMkLst>
+            <pc:docMk/>
+            <pc:sldMk cId="553003213" sldId="273"/>
+            <ac:spMk id="2" creationId="{E3636B59-CB02-E721-1276-D280D4520901}"/>
+          </ac:spMkLst>
+        </pc:spChg>
+      </pc:sldChg>
+      <pc:sldChg chg="modSp mod">
+        <pc:chgData name="Shreyas kumbar" userId="f1f765b0ac44d8da" providerId="LiveId" clId="{DBFF365C-EF49-4CC6-B5B0-B944393A3BCD}" dt="2023-06-29T07:50:47.872" v="10" actId="1076"/>
+        <pc:sldMkLst>
+          <pc:docMk/>
+          <pc:sldMk cId="810630661" sldId="274"/>
+        </pc:sldMkLst>
+        <pc:spChg chg="mod">
+          <ac:chgData name="Shreyas kumbar" userId="f1f765b0ac44d8da" providerId="LiveId" clId="{DBFF365C-EF49-4CC6-B5B0-B944393A3BCD}" dt="2023-06-29T07:50:47.872" v="10" actId="1076"/>
+          <ac:spMkLst>
+            <pc:docMk/>
+            <pc:sldMk cId="810630661" sldId="274"/>
+            <ac:spMk id="2" creationId="{F0AD892D-8948-856C-60B5-B2938CDBF7B7}"/>
+          </ac:spMkLst>
+        </pc:spChg>
+      </pc:sldChg>
+      <pc:sldChg chg="modSp mod">
+        <pc:chgData name="Shreyas kumbar" userId="f1f765b0ac44d8da" providerId="LiveId" clId="{DBFF365C-EF49-4CC6-B5B0-B944393A3BCD}" dt="2023-06-29T07:50:51.830" v="11" actId="1076"/>
+        <pc:sldMkLst>
+          <pc:docMk/>
+          <pc:sldMk cId="3769213366" sldId="275"/>
+        </pc:sldMkLst>
+        <pc:spChg chg="mod">
+          <ac:chgData name="Shreyas kumbar" userId="f1f765b0ac44d8da" providerId="LiveId" clId="{DBFF365C-EF49-4CC6-B5B0-B944393A3BCD}" dt="2023-06-29T07:50:51.830" v="11" actId="1076"/>
+          <ac:spMkLst>
+            <pc:docMk/>
+            <pc:sldMk cId="3769213366" sldId="275"/>
+            <ac:spMk id="2" creationId="{522A4AEF-A385-0EEC-B1CE-A722C0F7FFA5}"/>
+          </ac:spMkLst>
+        </pc:spChg>
+      </pc:sldChg>
+      <pc:sldChg chg="modSp mod">
+        <pc:chgData name="Shreyas kumbar" userId="f1f765b0ac44d8da" providerId="LiveId" clId="{DBFF365C-EF49-4CC6-B5B0-B944393A3BCD}" dt="2023-06-29T07:50:57.918" v="12" actId="1076"/>
+        <pc:sldMkLst>
+          <pc:docMk/>
+          <pc:sldMk cId="3137306212" sldId="276"/>
+        </pc:sldMkLst>
+        <pc:spChg chg="mod">
+          <ac:chgData name="Shreyas kumbar" userId="f1f765b0ac44d8da" providerId="LiveId" clId="{DBFF365C-EF49-4CC6-B5B0-B944393A3BCD}" dt="2023-06-29T07:50:57.918" v="12" actId="1076"/>
+          <ac:spMkLst>
+            <pc:docMk/>
+            <pc:sldMk cId="3137306212" sldId="276"/>
+            <ac:spMk id="2" creationId="{C9D14CFA-D091-677B-E72B-2E18AD53C2AA}"/>
+          </ac:spMkLst>
+        </pc:spChg>
+      </pc:sldChg>
+      <pc:sldChg chg="modSp mod">
+        <pc:chgData name="Shreyas kumbar" userId="f1f765b0ac44d8da" providerId="LiveId" clId="{DBFF365C-EF49-4CC6-B5B0-B944393A3BCD}" dt="2023-06-29T07:51:19.434" v="17" actId="1076"/>
+        <pc:sldMkLst>
+          <pc:docMk/>
+          <pc:sldMk cId="3571216836" sldId="278"/>
+        </pc:sldMkLst>
+        <pc:spChg chg="mod">
+          <ac:chgData name="Shreyas kumbar" userId="f1f765b0ac44d8da" providerId="LiveId" clId="{DBFF365C-EF49-4CC6-B5B0-B944393A3BCD}" dt="2023-06-29T07:51:19.434" v="17" actId="1076"/>
+          <ac:spMkLst>
+            <pc:docMk/>
+            <pc:sldMk cId="3571216836" sldId="278"/>
+            <ac:spMk id="2" creationId="{A3CDDF73-6806-7C63-5E31-FA1B37083B79}"/>
+          </ac:spMkLst>
+        </pc:spChg>
+      </pc:sldChg>
+      <pc:sldChg chg="modSp mod">
+        <pc:chgData name="Shreyas kumbar" userId="f1f765b0ac44d8da" providerId="LiveId" clId="{DBFF365C-EF49-4CC6-B5B0-B944393A3BCD}" dt="2023-06-29T07:51:24.410" v="18" actId="1076"/>
+        <pc:sldMkLst>
+          <pc:docMk/>
+          <pc:sldMk cId="1742565428" sldId="279"/>
+        </pc:sldMkLst>
+        <pc:spChg chg="mod">
+          <ac:chgData name="Shreyas kumbar" userId="f1f765b0ac44d8da" providerId="LiveId" clId="{DBFF365C-EF49-4CC6-B5B0-B944393A3BCD}" dt="2023-06-29T07:51:24.410" v="18" actId="1076"/>
+          <ac:spMkLst>
+            <pc:docMk/>
+            <pc:sldMk cId="1742565428" sldId="279"/>
+            <ac:spMk id="2" creationId="{29046F27-B1CF-A59C-D861-5F23008D842E}"/>
+          </ac:spMkLst>
+        </pc:spChg>
+      </pc:sldChg>
+      <pc:sldChg chg="modSp mod">
+        <pc:chgData name="Shreyas kumbar" userId="f1f765b0ac44d8da" providerId="LiveId" clId="{DBFF365C-EF49-4CC6-B5B0-B944393A3BCD}" dt="2023-06-29T07:51:07.867" v="14" actId="1076"/>
+        <pc:sldMkLst>
+          <pc:docMk/>
+          <pc:sldMk cId="3359146823" sldId="280"/>
+        </pc:sldMkLst>
+        <pc:spChg chg="mod">
+          <ac:chgData name="Shreyas kumbar" userId="f1f765b0ac44d8da" providerId="LiveId" clId="{DBFF365C-EF49-4CC6-B5B0-B944393A3BCD}" dt="2023-06-29T07:51:07.867" v="14" actId="1076"/>
+          <ac:spMkLst>
+            <pc:docMk/>
+            <pc:sldMk cId="3359146823" sldId="280"/>
+            <ac:spMk id="2" creationId="{9E202556-E676-BF3D-AF4D-709E3EE92F72}"/>
+          </ac:spMkLst>
+        </pc:spChg>
+      </pc:sldChg>
+      <pc:sldChg chg="modSp mod">
+        <pc:chgData name="Shreyas kumbar" userId="f1f765b0ac44d8da" providerId="LiveId" clId="{DBFF365C-EF49-4CC6-B5B0-B944393A3BCD}" dt="2023-06-29T07:51:03.308" v="13" actId="1076"/>
+        <pc:sldMkLst>
+          <pc:docMk/>
+          <pc:sldMk cId="254566338" sldId="281"/>
+        </pc:sldMkLst>
+        <pc:spChg chg="mod">
+          <ac:chgData name="Shreyas kumbar" userId="f1f765b0ac44d8da" providerId="LiveId" clId="{DBFF365C-EF49-4CC6-B5B0-B944393A3BCD}" dt="2023-06-29T07:51:03.308" v="13" actId="1076"/>
+          <ac:spMkLst>
+            <pc:docMk/>
+            <pc:sldMk cId="254566338" sldId="281"/>
+            <ac:spMk id="2" creationId="{05C0759A-2386-7C72-948D-94A72A13120A}"/>
+          </ac:spMkLst>
+        </pc:spChg>
+      </pc:sldChg>
+      <pc:sldChg chg="modSp mod">
+        <pc:chgData name="Shreyas kumbar" userId="f1f765b0ac44d8da" providerId="LiveId" clId="{DBFF365C-EF49-4CC6-B5B0-B944393A3BCD}" dt="2023-06-29T07:51:12.079" v="15" actId="1076"/>
+        <pc:sldMkLst>
+          <pc:docMk/>
+          <pc:sldMk cId="796070820" sldId="282"/>
+        </pc:sldMkLst>
+        <pc:spChg chg="mod">
+          <ac:chgData name="Shreyas kumbar" userId="f1f765b0ac44d8da" providerId="LiveId" clId="{DBFF365C-EF49-4CC6-B5B0-B944393A3BCD}" dt="2023-06-29T07:51:12.079" v="15" actId="1076"/>
+          <ac:spMkLst>
+            <pc:docMk/>
+            <pc:sldMk cId="796070820" sldId="282"/>
+            <ac:spMk id="2" creationId="{78E0F56C-A252-27A7-6665-BA08651B650B}"/>
+          </ac:spMkLst>
+        </pc:spChg>
+      </pc:sldChg>
+      <pc:sldChg chg="modSp mod">
+        <pc:chgData name="Shreyas kumbar" userId="f1f765b0ac44d8da" providerId="LiveId" clId="{DBFF365C-EF49-4CC6-B5B0-B944393A3BCD}" dt="2023-06-29T07:51:15.125" v="16" actId="1076"/>
+        <pc:sldMkLst>
+          <pc:docMk/>
+          <pc:sldMk cId="2652093347" sldId="283"/>
+        </pc:sldMkLst>
+        <pc:spChg chg="mod">
+          <ac:chgData name="Shreyas kumbar" userId="f1f765b0ac44d8da" providerId="LiveId" clId="{DBFF365C-EF49-4CC6-B5B0-B944393A3BCD}" dt="2023-06-29T07:51:15.125" v="16" actId="1076"/>
+          <ac:spMkLst>
+            <pc:docMk/>
+            <pc:sldMk cId="2652093347" sldId="283"/>
+            <ac:spMk id="2" creationId="{D5A1B627-B9EF-958C-0426-198947C29C63}"/>
+          </ac:spMkLst>
+        </pc:spChg>
+      </pc:sldChg>
+    </pc:docChg>
+  </pc:docChgLst>
   <pc:docChgLst>
     <pc:chgData name="palak jain" userId="6d46eec39c0c2402" providerId="LiveId" clId="{BABB1F32-5CEB-42F1-AF1F-C40D7308649C}"/>
     <pc:docChg chg="undo custSel modSld modMainMaster">
@@ -1303,7 +1608,7 @@
           <a:p>
             <a:fld id="{07009E1E-45B5-4B5B-9B24-E02D7AEE353F}" type="datetimeFigureOut">
               <a:rPr lang="en-IN" smtClean="0"/>
-              <a:t>26-06-2023</a:t>
+              <a:t>29-06-2023</a:t>
             </a:fld>
             <a:endParaRPr lang="en-IN"/>
           </a:p>
@@ -1485,7 +1790,7 @@
           <a:p>
             <a:fld id="{07009E1E-45B5-4B5B-9B24-E02D7AEE353F}" type="datetimeFigureOut">
               <a:rPr lang="en-IN" smtClean="0"/>
-              <a:t>26-06-2023</a:t>
+              <a:t>29-06-2023</a:t>
             </a:fld>
             <a:endParaRPr lang="en-IN"/>
           </a:p>
@@ -1677,7 +1982,7 @@
           <a:p>
             <a:fld id="{07009E1E-45B5-4B5B-9B24-E02D7AEE353F}" type="datetimeFigureOut">
               <a:rPr lang="en-IN" smtClean="0"/>
-              <a:t>26-06-2023</a:t>
+              <a:t>29-06-2023</a:t>
             </a:fld>
             <a:endParaRPr lang="en-IN"/>
           </a:p>
@@ -1859,7 +2164,7 @@
           <a:p>
             <a:fld id="{07009E1E-45B5-4B5B-9B24-E02D7AEE353F}" type="datetimeFigureOut">
               <a:rPr lang="en-IN" smtClean="0"/>
-              <a:t>26-06-2023</a:t>
+              <a:t>29-06-2023</a:t>
             </a:fld>
             <a:endParaRPr lang="en-IN"/>
           </a:p>
@@ -2139,7 +2444,7 @@
           <a:p>
             <a:fld id="{07009E1E-45B5-4B5B-9B24-E02D7AEE353F}" type="datetimeFigureOut">
               <a:rPr lang="en-IN" smtClean="0"/>
-              <a:t>26-06-2023</a:t>
+              <a:t>29-06-2023</a:t>
             </a:fld>
             <a:endParaRPr lang="en-IN"/>
           </a:p>
@@ -2383,7 +2688,7 @@
           <a:p>
             <a:fld id="{07009E1E-45B5-4B5B-9B24-E02D7AEE353F}" type="datetimeFigureOut">
               <a:rPr lang="en-IN" smtClean="0"/>
-              <a:t>26-06-2023</a:t>
+              <a:t>29-06-2023</a:t>
             </a:fld>
             <a:endParaRPr lang="en-IN"/>
           </a:p>
@@ -2754,7 +3059,7 @@
           <a:p>
             <a:fld id="{07009E1E-45B5-4B5B-9B24-E02D7AEE353F}" type="datetimeFigureOut">
               <a:rPr lang="en-IN" smtClean="0"/>
-              <a:t>26-06-2023</a:t>
+              <a:t>29-06-2023</a:t>
             </a:fld>
             <a:endParaRPr lang="en-IN"/>
           </a:p>
@@ -2907,7 +3212,7 @@
           <a:p>
             <a:fld id="{07009E1E-45B5-4B5B-9B24-E02D7AEE353F}" type="datetimeFigureOut">
               <a:rPr lang="en-IN" smtClean="0"/>
-              <a:t>26-06-2023</a:t>
+              <a:t>29-06-2023</a:t>
             </a:fld>
             <a:endParaRPr lang="en-IN"/>
           </a:p>
@@ -3014,7 +3319,7 @@
           <a:p>
             <a:fld id="{07009E1E-45B5-4B5B-9B24-E02D7AEE353F}" type="datetimeFigureOut">
               <a:rPr lang="en-IN" smtClean="0"/>
-              <a:t>26-06-2023</a:t>
+              <a:t>29-06-2023</a:t>
             </a:fld>
             <a:endParaRPr lang="en-IN"/>
           </a:p>
@@ -3383,7 +3688,7 @@
           <a:p>
             <a:fld id="{07009E1E-45B5-4B5B-9B24-E02D7AEE353F}" type="datetimeFigureOut">
               <a:rPr lang="en-IN" smtClean="0"/>
-              <a:t>26-06-2023</a:t>
+              <a:t>29-06-2023</a:t>
             </a:fld>
             <a:endParaRPr lang="en-IN"/>
           </a:p>
@@ -3752,7 +4057,7 @@
           <a:p>
             <a:fld id="{07009E1E-45B5-4B5B-9B24-E02D7AEE353F}" type="datetimeFigureOut">
               <a:rPr lang="en-IN" smtClean="0"/>
-              <a:t>26-06-2023</a:t>
+              <a:t>29-06-2023</a:t>
             </a:fld>
             <a:endParaRPr lang="en-IN"/>
           </a:p>
@@ -4006,7 +4311,7 @@
           <a:p>
             <a:fld id="{07009E1E-45B5-4B5B-9B24-E02D7AEE353F}" type="datetimeFigureOut">
               <a:rPr lang="en-IN" smtClean="0"/>
-              <a:t>26-06-2023</a:t>
+              <a:t>29-06-2023</a:t>
             </a:fld>
             <a:endParaRPr lang="en-IN"/>
           </a:p>
@@ -6597,7 +6902,31 @@
                 <a:latin typeface="Times New Roman" panose="02020603050405020304" pitchFamily="18" charset="0"/>
                 <a:cs typeface="Times New Roman" panose="02020603050405020304" pitchFamily="18" charset="0"/>
               </a:rPr>
-              <a:t>In this module user can view the Disease.</a:t>
+              <a:t>In this module user can view the </a:t>
+            </a:r>
+            <a:r>
+              <a:rPr lang="en-US" dirty="0">
+                <a:solidFill>
+                  <a:schemeClr val="tx2">
+                    <a:lumMod val="10000"/>
+                  </a:schemeClr>
+                </a:solidFill>
+                <a:latin typeface="Times New Roman" panose="02020603050405020304" pitchFamily="18" charset="0"/>
+                <a:cs typeface="Times New Roman" panose="02020603050405020304" pitchFamily="18" charset="0"/>
+              </a:rPr>
+              <a:t>Symptoms</a:t>
+            </a:r>
+            <a:r>
+              <a:rPr lang="en-US" sz="1800" dirty="0">
+                <a:solidFill>
+                  <a:schemeClr val="tx2">
+                    <a:lumMod val="10000"/>
+                  </a:schemeClr>
+                </a:solidFill>
+                <a:latin typeface="Times New Roman" panose="02020603050405020304" pitchFamily="18" charset="0"/>
+                <a:cs typeface="Times New Roman" panose="02020603050405020304" pitchFamily="18" charset="0"/>
+              </a:rPr>
+              <a:t>.</a:t>
             </a:r>
           </a:p>
           <a:p>
@@ -6630,7 +6959,31 @@
                 <a:latin typeface="Times New Roman" panose="02020603050405020304" pitchFamily="18" charset="0"/>
                 <a:cs typeface="Times New Roman" panose="02020603050405020304" pitchFamily="18" charset="0"/>
               </a:rPr>
-              <a:t>In this module user can be able to predict Disease.</a:t>
+              <a:t>In this module </a:t>
+            </a:r>
+            <a:r>
+              <a:rPr lang="en-US" dirty="0">
+                <a:solidFill>
+                  <a:schemeClr val="tx2">
+                    <a:lumMod val="10000"/>
+                  </a:schemeClr>
+                </a:solidFill>
+                <a:latin typeface="Times New Roman" panose="02020603050405020304" pitchFamily="18" charset="0"/>
+                <a:cs typeface="Times New Roman" panose="02020603050405020304" pitchFamily="18" charset="0"/>
+              </a:rPr>
+              <a:t>system</a:t>
+            </a:r>
+            <a:r>
+              <a:rPr lang="en-US" sz="1800" dirty="0">
+                <a:solidFill>
+                  <a:schemeClr val="tx2">
+                    <a:lumMod val="10000"/>
+                  </a:schemeClr>
+                </a:solidFill>
+                <a:latin typeface="Times New Roman" panose="02020603050405020304" pitchFamily="18" charset="0"/>
+                <a:cs typeface="Times New Roman" panose="02020603050405020304" pitchFamily="18" charset="0"/>
+              </a:rPr>
+              <a:t> will be able to predict Disease.</a:t>
             </a:r>
           </a:p>
           <a:p>
@@ -6770,8 +7123,8 @@
         </p:nvSpPr>
         <p:spPr>
           <a:xfrm>
-            <a:off x="3657600" y="297887"/>
-            <a:ext cx="4245429" cy="1507067"/>
+            <a:off x="3657600" y="625151"/>
+            <a:ext cx="4245429" cy="1179803"/>
           </a:xfrm>
         </p:spPr>
         <p:txBody>
@@ -6864,7 +7217,19 @@
                 <a:ea typeface="Cambria" panose="02040503050406030204" pitchFamily="18" charset="0"/>
                 <a:cs typeface="Times New Roman" panose="02020603050405020304" pitchFamily="18" charset="0"/>
               </a:rPr>
-              <a:t>The project that we're working on can be implemented in any location.</a:t>
+              <a:t>In the future, </a:t>
+            </a:r>
+            <a:r>
+              <a:rPr lang="en-US" sz="1800" dirty="0">
+                <a:solidFill>
+                  <a:schemeClr val="tx2">
+                    <a:lumMod val="10000"/>
+                  </a:schemeClr>
+                </a:solidFill>
+                <a:latin typeface="Times New Roman" panose="02020603050405020304" pitchFamily="18" charset="0"/>
+                <a:cs typeface="Times New Roman" panose="02020603050405020304" pitchFamily="18" charset="0"/>
+              </a:rPr>
+              <a:t>Online communication with doctors will be possible for users.</a:t>
             </a:r>
             <a:endParaRPr lang="en-IN" sz="1800" dirty="0">
               <a:solidFill>
@@ -7050,7 +7415,7 @@
         </p:nvSpPr>
         <p:spPr>
           <a:xfrm>
-            <a:off x="4437542" y="0"/>
+            <a:off x="4437542" y="39423"/>
             <a:ext cx="3316916" cy="597913"/>
           </a:xfrm>
         </p:spPr>
@@ -7162,7 +7527,7 @@
         </p:nvSpPr>
         <p:spPr>
           <a:xfrm>
-            <a:off x="4656846" y="0"/>
+            <a:off x="4656846" y="87549"/>
             <a:ext cx="2779409" cy="588186"/>
           </a:xfrm>
         </p:spPr>
@@ -7383,7 +7748,7 @@
         </p:nvSpPr>
         <p:spPr>
           <a:xfrm>
-            <a:off x="4299833" y="0"/>
+            <a:off x="4402470" y="116733"/>
             <a:ext cx="3767207" cy="485192"/>
           </a:xfrm>
         </p:spPr>
@@ -7495,7 +7860,7 @@
         </p:nvSpPr>
         <p:spPr>
           <a:xfrm>
-            <a:off x="4501474" y="0"/>
+            <a:off x="4501474" y="93306"/>
             <a:ext cx="3189051" cy="403360"/>
           </a:xfrm>
         </p:spPr>
@@ -7607,7 +7972,7 @@
         </p:nvSpPr>
         <p:spPr>
           <a:xfrm>
-            <a:off x="3304270" y="0"/>
+            <a:off x="3276278" y="83976"/>
             <a:ext cx="6134370" cy="518107"/>
           </a:xfrm>
         </p:spPr>
@@ -7719,7 +8084,7 @@
         </p:nvSpPr>
         <p:spPr>
           <a:xfrm>
-            <a:off x="3561080" y="10160"/>
+            <a:off x="3514427" y="0"/>
             <a:ext cx="5623560" cy="691515"/>
           </a:xfrm>
         </p:spPr>
@@ -7945,7 +8310,7 @@
         </p:nvSpPr>
         <p:spPr>
           <a:xfrm>
-            <a:off x="4145280" y="0"/>
+            <a:off x="4145280" y="27992"/>
             <a:ext cx="3901440" cy="396875"/>
           </a:xfrm>
         </p:spPr>
@@ -8057,7 +8422,7 @@
         </p:nvSpPr>
         <p:spPr>
           <a:xfrm>
-            <a:off x="4295138" y="0"/>
+            <a:off x="4295138" y="18661"/>
             <a:ext cx="4462782" cy="508635"/>
           </a:xfrm>
         </p:spPr>
@@ -8169,7 +8534,7 @@
         </p:nvSpPr>
         <p:spPr>
           <a:xfrm>
-            <a:off x="3865880" y="0"/>
+            <a:off x="3865880" y="121920"/>
             <a:ext cx="4739640" cy="427355"/>
           </a:xfrm>
         </p:spPr>
@@ -8281,7 +8646,7 @@
         </p:nvSpPr>
         <p:spPr>
           <a:xfrm>
-            <a:off x="3876040" y="0"/>
+            <a:off x="3876040" y="55984"/>
             <a:ext cx="4871720" cy="488315"/>
           </a:xfrm>
         </p:spPr>
@@ -8393,7 +8758,7 @@
         </p:nvSpPr>
         <p:spPr>
           <a:xfrm>
-            <a:off x="3947418" y="0"/>
+            <a:off x="3956748" y="74645"/>
             <a:ext cx="3967222" cy="417195"/>
           </a:xfrm>
         </p:spPr>
@@ -8967,7 +9332,7 @@
         </p:nvSpPr>
         <p:spPr>
           <a:xfrm>
-            <a:off x="3522980" y="-10161"/>
+            <a:off x="3641090" y="120147"/>
             <a:ext cx="4909820" cy="559435"/>
           </a:xfrm>
         </p:spPr>
@@ -9131,7 +9496,7 @@
         <p:spPr>
           <a:xfrm>
             <a:off x="1024708" y="1909570"/>
-            <a:ext cx="10598332" cy="3323973"/>
+            <a:ext cx="10598332" cy="3800765"/>
           </a:xfrm>
         </p:spPr>
         <p:txBody>
@@ -9140,11 +9505,12 @@
           </a:bodyPr>
           <a:lstStyle/>
           <a:p>
-            <a:pPr marL="0" indent="0" algn="just">
+            <a:pPr algn="just">
               <a:lnSpc>
                 <a:spcPct val="150000"/>
               </a:lnSpc>
-              <a:buNone/>
+              <a:buFont typeface="Wingdings" panose="05000000000000000000" pitchFamily="2" charset="2"/>
+              <a:buChar char="§"/>
             </a:pPr>
             <a:r>
               <a:rPr lang="en-US" sz="1800" dirty="0">
@@ -9156,7 +9522,82 @@
                 <a:latin typeface="Times New Roman" panose="02020603050405020304" pitchFamily="18" charset="0"/>
                 <a:cs typeface="Times New Roman" panose="02020603050405020304" pitchFamily="18" charset="0"/>
               </a:rPr>
-              <a:t>Our competent and experienced staff will design and build a website that fully corresponds to all pre-established system criteria. The website will offer a number of carefully built components, such as an advanced disease prediction module, extensive user management capabilities and highly effective doctor management features. Visitors to the site will be able to accurately assess their overall health status by utilizing the advanced capabilities of the disease prediction module, while also receiving personalized recommendations on appropriate disease management strategies and being connected with best-fit specialist doctors for their individual needs.</a:t>
+              <a:t>Our competent and experienced staff will design and build a website that fully corresponds to all pre-established system criteria. </a:t>
+            </a:r>
+          </a:p>
+          <a:p>
+            <a:pPr algn="just">
+              <a:lnSpc>
+                <a:spcPct val="150000"/>
+              </a:lnSpc>
+              <a:buFont typeface="Wingdings" panose="05000000000000000000" pitchFamily="2" charset="2"/>
+              <a:buChar char="§"/>
+            </a:pPr>
+            <a:r>
+              <a:rPr lang="en-US" sz="1800" dirty="0">
+                <a:solidFill>
+                  <a:schemeClr val="tx2">
+                    <a:lumMod val="10000"/>
+                  </a:schemeClr>
+                </a:solidFill>
+                <a:latin typeface="Times New Roman" panose="02020603050405020304" pitchFamily="18" charset="0"/>
+                <a:cs typeface="Times New Roman" panose="02020603050405020304" pitchFamily="18" charset="0"/>
+              </a:rPr>
+              <a:t>The website will offer a number of carefully built components, such as  disease prediction module, user management and doctor management features. </a:t>
+            </a:r>
+          </a:p>
+          <a:p>
+            <a:pPr algn="just">
+              <a:lnSpc>
+                <a:spcPct val="150000"/>
+              </a:lnSpc>
+              <a:buFont typeface="Wingdings" panose="05000000000000000000" pitchFamily="2" charset="2"/>
+              <a:buChar char="§"/>
+            </a:pPr>
+            <a:r>
+              <a:rPr lang="en-US" sz="1800" dirty="0">
+                <a:solidFill>
+                  <a:schemeClr val="tx2">
+                    <a:lumMod val="10000"/>
+                  </a:schemeClr>
+                </a:solidFill>
+                <a:latin typeface="Times New Roman" panose="02020603050405020304" pitchFamily="18" charset="0"/>
+                <a:cs typeface="Times New Roman" panose="02020603050405020304" pitchFamily="18" charset="0"/>
+              </a:rPr>
+              <a:t>Visitors to the site will be able to accurately assess their overall health status by utilizing the advanced capabilities of the disease prediction module</a:t>
+            </a:r>
+            <a:r>
+              <a:rPr lang="en-US" dirty="0">
+                <a:solidFill>
+                  <a:schemeClr val="tx2">
+                    <a:lumMod val="10000"/>
+                  </a:schemeClr>
+                </a:solidFill>
+                <a:latin typeface="Times New Roman" panose="02020603050405020304" pitchFamily="18" charset="0"/>
+                <a:cs typeface="Times New Roman" panose="02020603050405020304" pitchFamily="18" charset="0"/>
+              </a:rPr>
+              <a:t>.</a:t>
+            </a:r>
+          </a:p>
+          <a:p>
+            <a:pPr algn="just">
+              <a:lnSpc>
+                <a:spcPct val="150000"/>
+              </a:lnSpc>
+              <a:buFont typeface="Wingdings" panose="05000000000000000000" pitchFamily="2" charset="2"/>
+              <a:buChar char="§"/>
+            </a:pPr>
+            <a:r>
+              <a:rPr lang="en-US" sz="1800" dirty="0">
+                <a:solidFill>
+                  <a:schemeClr val="tx2">
+                    <a:lumMod val="10000"/>
+                  </a:schemeClr>
+                </a:solidFill>
+                <a:latin typeface="Times New Roman" panose="02020603050405020304" pitchFamily="18" charset="0"/>
+                <a:cs typeface="Times New Roman" panose="02020603050405020304" pitchFamily="18" charset="0"/>
+              </a:rPr>
+              <a:t>Users will receive personalized advice on the best disease management techniques and being put in touch with the best-suited expert doctors for their particular needs.</a:t>
             </a:r>
             <a:endParaRPr lang="en-IN" sz="1800" dirty="0">
               <a:solidFill>
@@ -9230,19 +9671,19 @@
         </p:nvSpPr>
         <p:spPr>
           <a:xfrm>
-            <a:off x="1988009" y="0"/>
-            <a:ext cx="8812071" cy="1097350"/>
+            <a:off x="1528935" y="190500"/>
+            <a:ext cx="9413416" cy="1428750"/>
           </a:xfrm>
         </p:spPr>
         <p:txBody>
           <a:bodyPr>
-            <a:normAutofit fontScale="90000"/>
+            <a:noAutofit/>
           </a:bodyPr>
           <a:lstStyle/>
           <a:p>
             <a:pPr algn="just"/>
             <a:r>
-              <a:rPr lang="en-US" sz="4000" dirty="0">
+              <a:rPr lang="en-US" sz="4000" u="sng" dirty="0">
                 <a:solidFill>
                   <a:schemeClr val="tx2">
                     <a:lumMod val="10000"/>
@@ -9253,7 +9694,7 @@
               </a:rPr>
               <a:t>References and Bibliography</a:t>
             </a:r>
-            <a:endParaRPr lang="en-IN" sz="4000" dirty="0">
+            <a:endParaRPr lang="en-IN" sz="4000" u="sng" dirty="0">
               <a:solidFill>
                 <a:schemeClr val="tx2">
                   <a:lumMod val="10000"/>
@@ -9283,8 +9724,8 @@
         </p:nvSpPr>
         <p:spPr>
           <a:xfrm>
-            <a:off x="684418" y="1188720"/>
-            <a:ext cx="11121501" cy="5557520"/>
+            <a:off x="674893" y="1712595"/>
+            <a:ext cx="11121501" cy="5212080"/>
           </a:xfrm>
         </p:spPr>
         <p:txBody>
@@ -9627,7 +10068,7 @@
         </p:nvSpPr>
         <p:spPr>
           <a:xfrm>
-            <a:off x="3317854" y="2675466"/>
+            <a:off x="2608887" y="2675466"/>
             <a:ext cx="6974226" cy="1507067"/>
           </a:xfrm>
         </p:spPr>
@@ -10263,7 +10704,7 @@
                 <a:ea typeface="Calibri" panose="020F0502020204030204" pitchFamily="34" charset="0"/>
                 <a:cs typeface="Times New Roman" panose="02020603050405020304" pitchFamily="18" charset="0"/>
               </a:rPr>
-              <a:t> system. Users may access this portal to have their symptoms predicted, but doctors must register for it. The system will then make a recommendation for the finest physician via this portal at that time. The user will discover the ideal medical professional for his condition. We will use full stack development languages including PHP, JavaScript, Bootstrap, MySQL DB, HTML, and CSS to accomplish this project.</a:t>
+              <a:t> system. Users may access this portal to have their symptoms predicted, but doctors must register for it. The system will then make a recommendation for the finest physician via this portal at that time. The user will discover the ideal medical professional for his condition. </a:t>
             </a:r>
             <a:endParaRPr lang="en-IN" sz="1800" dirty="0">
               <a:solidFill>
@@ -10339,7 +10780,7 @@
         </p:nvSpPr>
         <p:spPr>
           <a:xfrm>
-            <a:off x="2709312" y="191277"/>
+            <a:off x="2959953" y="200555"/>
             <a:ext cx="5266122" cy="945216"/>
           </a:xfrm>
         </p:spPr>
@@ -10650,7 +11091,7 @@
                 <a:latin typeface="Times New Roman" panose="02020603050405020304" pitchFamily="18" charset="0"/>
                 <a:cs typeface="Times New Roman" panose="02020603050405020304" pitchFamily="18" charset="0"/>
               </a:rPr>
-              <a:t> XAMP Server.</a:t>
+              <a:t> XAMPP Server.</a:t>
             </a:r>
           </a:p>
           <a:p>
@@ -11237,8 +11678,8 @@
         </p:nvSpPr>
         <p:spPr>
           <a:xfrm>
-            <a:off x="3996579" y="334380"/>
-            <a:ext cx="4344781" cy="1507067"/>
+            <a:off x="2231136" y="964692"/>
+            <a:ext cx="7729728" cy="1188720"/>
           </a:xfrm>
         </p:spPr>
         <p:txBody>
@@ -11248,12 +11689,7 @@
           <a:lstStyle/>
           <a:p>
             <a:r>
-              <a:rPr lang="en-IN" sz="4000" b="1" u="sng" dirty="0">
-                <a:solidFill>
-                  <a:schemeClr val="tx2">
-                    <a:lumMod val="10000"/>
-                  </a:schemeClr>
-                </a:solidFill>
+              <a:rPr lang="en-IN" sz="4000" u="sng" dirty="0">
                 <a:latin typeface="Times New Roman" panose="02020603050405020304" pitchFamily="18" charset="0"/>
                 <a:cs typeface="Times New Roman" panose="02020603050405020304" pitchFamily="18" charset="0"/>
               </a:rPr>
@@ -11280,8 +11716,8 @@
         </p:nvSpPr>
         <p:spPr>
           <a:xfrm>
-            <a:off x="2595797" y="2198253"/>
-            <a:ext cx="6166940" cy="3336785"/>
+            <a:off x="2231136" y="2638044"/>
+            <a:ext cx="7729728" cy="2172081"/>
           </a:xfrm>
         </p:spPr>
         <p:txBody>
@@ -11290,86 +11726,26 @@
           </a:bodyPr>
           <a:lstStyle/>
           <a:p>
-            <a:pPr algn="just">
-              <a:lnSpc>
-                <a:spcPct val="150000"/>
-              </a:lnSpc>
-              <a:buFont typeface="Wingdings" panose="05000000000000000000" pitchFamily="2" charset="2"/>
-              <a:buChar char="§"/>
-            </a:pPr>
-            <a:r>
-              <a:rPr lang="en-US" sz="1800" dirty="0">
-                <a:solidFill>
-                  <a:schemeClr val="tx2">
-                    <a:lumMod val="10000"/>
-                  </a:schemeClr>
-                </a:solidFill>
-                <a:latin typeface="Times New Roman" panose="02020603050405020304" pitchFamily="18" charset="0"/>
-                <a:cs typeface="Times New Roman" panose="02020603050405020304" pitchFamily="18" charset="0"/>
-              </a:rPr>
+            <a:r>
+              <a:rPr lang="en-US" dirty="0"/>
               <a:t>Information about diseases is available to users anytime and everywhere.</a:t>
             </a:r>
           </a:p>
           <a:p>
-            <a:pPr algn="just">
-              <a:lnSpc>
-                <a:spcPct val="150000"/>
-              </a:lnSpc>
-              <a:buFont typeface="Wingdings" panose="05000000000000000000" pitchFamily="2" charset="2"/>
-              <a:buChar char="§"/>
-            </a:pPr>
-            <a:r>
-              <a:rPr lang="en-US" sz="1800" dirty="0">
-                <a:solidFill>
-                  <a:schemeClr val="tx2">
-                    <a:lumMod val="10000"/>
-                  </a:schemeClr>
-                </a:solidFill>
-                <a:latin typeface="Times New Roman" panose="02020603050405020304" pitchFamily="18" charset="0"/>
-                <a:cs typeface="Times New Roman" panose="02020603050405020304" pitchFamily="18" charset="0"/>
-              </a:rPr>
+            <a:r>
+              <a:rPr lang="en-US" dirty="0"/>
               <a:t>Cut down on user time.</a:t>
             </a:r>
           </a:p>
           <a:p>
-            <a:pPr algn="just">
-              <a:lnSpc>
-                <a:spcPct val="150000"/>
-              </a:lnSpc>
-              <a:buFont typeface="Wingdings" panose="05000000000000000000" pitchFamily="2" charset="2"/>
-              <a:buChar char="§"/>
-            </a:pPr>
-            <a:r>
-              <a:rPr lang="en-US" sz="1800" dirty="0">
-                <a:solidFill>
-                  <a:schemeClr val="tx2">
-                    <a:lumMod val="10000"/>
-                  </a:schemeClr>
-                </a:solidFill>
-                <a:latin typeface="Times New Roman" panose="02020603050405020304" pitchFamily="18" charset="0"/>
-                <a:cs typeface="Times New Roman" panose="02020603050405020304" pitchFamily="18" charset="0"/>
-              </a:rPr>
+            <a:r>
+              <a:rPr lang="en-US" dirty="0"/>
               <a:t>Easy illness prediction will be possible for the user.</a:t>
             </a:r>
           </a:p>
           <a:p>
-            <a:pPr algn="just">
-              <a:lnSpc>
-                <a:spcPct val="150000"/>
-              </a:lnSpc>
-              <a:buFont typeface="Wingdings" panose="05000000000000000000" pitchFamily="2" charset="2"/>
-              <a:buChar char="§"/>
-            </a:pPr>
-            <a:r>
-              <a:rPr lang="en-US" sz="1800" dirty="0">
-                <a:solidFill>
-                  <a:schemeClr val="tx2">
-                    <a:lumMod val="10000"/>
-                  </a:schemeClr>
-                </a:solidFill>
-                <a:latin typeface="Times New Roman" panose="02020603050405020304" pitchFamily="18" charset="0"/>
-                <a:cs typeface="Times New Roman" panose="02020603050405020304" pitchFamily="18" charset="0"/>
-              </a:rPr>
+            <a:r>
+              <a:rPr lang="en-US" dirty="0"/>
               <a:t>Based on their disease, users may quickly identify qualified doctors.</a:t>
             </a:r>
           </a:p>

</xml_diff>